<commit_message>
small updates to lecture 6
</commit_message>
<xml_diff>
--- a/classes/stats2017/Lecture06.pptx
+++ b/classes/stats2017/Lecture06.pptx
@@ -237,7 +237,7 @@
             <a:fld id="{423AD07F-71EA-4875-813B-E57FF907F655}" type="datetimeFigureOut">
               <a:rPr lang="en-US" smtClean="0"/>
               <a:pPr/>
-              <a:t>1/20/2017</a:t>
+              <a:t>1/26/2017</a:t>
             </a:fld>
             <a:endParaRPr lang="en-US"/>
           </a:p>
@@ -2514,7 +2514,7 @@
             <a:fld id="{1D8BD707-D9CF-40AE-B4C6-C98DA3205C09}" type="datetimeFigureOut">
               <a:rPr lang="en-US" smtClean="0"/>
               <a:pPr/>
-              <a:t>1/20/2017</a:t>
+              <a:t>1/26/2017</a:t>
             </a:fld>
             <a:endParaRPr lang="en-US"/>
           </a:p>
@@ -2679,7 +2679,7 @@
             <a:fld id="{1D8BD707-D9CF-40AE-B4C6-C98DA3205C09}" type="datetimeFigureOut">
               <a:rPr lang="en-US" smtClean="0"/>
               <a:pPr/>
-              <a:t>1/20/2017</a:t>
+              <a:t>1/26/2017</a:t>
             </a:fld>
             <a:endParaRPr lang="en-US"/>
           </a:p>
@@ -2854,7 +2854,7 @@
             <a:fld id="{1D8BD707-D9CF-40AE-B4C6-C98DA3205C09}" type="datetimeFigureOut">
               <a:rPr lang="en-US" smtClean="0"/>
               <a:pPr/>
-              <a:t>1/20/2017</a:t>
+              <a:t>1/26/2017</a:t>
             </a:fld>
             <a:endParaRPr lang="en-US"/>
           </a:p>
@@ -3019,7 +3019,7 @@
             <a:fld id="{1D8BD707-D9CF-40AE-B4C6-C98DA3205C09}" type="datetimeFigureOut">
               <a:rPr lang="en-US" smtClean="0"/>
               <a:pPr/>
-              <a:t>1/20/2017</a:t>
+              <a:t>1/26/2017</a:t>
             </a:fld>
             <a:endParaRPr lang="en-US"/>
           </a:p>
@@ -3261,7 +3261,7 @@
             <a:fld id="{1D8BD707-D9CF-40AE-B4C6-C98DA3205C09}" type="datetimeFigureOut">
               <a:rPr lang="en-US" smtClean="0"/>
               <a:pPr/>
-              <a:t>1/20/2017</a:t>
+              <a:t>1/26/2017</a:t>
             </a:fld>
             <a:endParaRPr lang="en-US"/>
           </a:p>
@@ -3543,7 +3543,7 @@
             <a:fld id="{1D8BD707-D9CF-40AE-B4C6-C98DA3205C09}" type="datetimeFigureOut">
               <a:rPr lang="en-US" smtClean="0"/>
               <a:pPr/>
-              <a:t>1/20/2017</a:t>
+              <a:t>1/26/2017</a:t>
             </a:fld>
             <a:endParaRPr lang="en-US"/>
           </a:p>
@@ -3959,7 +3959,7 @@
             <a:fld id="{1D8BD707-D9CF-40AE-B4C6-C98DA3205C09}" type="datetimeFigureOut">
               <a:rPr lang="en-US" smtClean="0"/>
               <a:pPr/>
-              <a:t>1/20/2017</a:t>
+              <a:t>1/26/2017</a:t>
             </a:fld>
             <a:endParaRPr lang="en-US"/>
           </a:p>
@@ -4073,7 +4073,7 @@
             <a:fld id="{1D8BD707-D9CF-40AE-B4C6-C98DA3205C09}" type="datetimeFigureOut">
               <a:rPr lang="en-US" smtClean="0"/>
               <a:pPr/>
-              <a:t>1/20/2017</a:t>
+              <a:t>1/26/2017</a:t>
             </a:fld>
             <a:endParaRPr lang="en-US"/>
           </a:p>
@@ -4165,7 +4165,7 @@
             <a:fld id="{1D8BD707-D9CF-40AE-B4C6-C98DA3205C09}" type="datetimeFigureOut">
               <a:rPr lang="en-US" smtClean="0"/>
               <a:pPr/>
-              <a:t>1/20/2017</a:t>
+              <a:t>1/26/2017</a:t>
             </a:fld>
             <a:endParaRPr lang="en-US"/>
           </a:p>
@@ -4437,7 +4437,7 @@
             <a:fld id="{1D8BD707-D9CF-40AE-B4C6-C98DA3205C09}" type="datetimeFigureOut">
               <a:rPr lang="en-US" smtClean="0"/>
               <a:pPr/>
-              <a:t>1/20/2017</a:t>
+              <a:t>1/26/2017</a:t>
             </a:fld>
             <a:endParaRPr lang="en-US"/>
           </a:p>
@@ -4686,7 +4686,7 @@
             <a:fld id="{1D8BD707-D9CF-40AE-B4C6-C98DA3205C09}" type="datetimeFigureOut">
               <a:rPr lang="en-US" smtClean="0"/>
               <a:pPr/>
-              <a:t>1/20/2017</a:t>
+              <a:t>1/26/2017</a:t>
             </a:fld>
             <a:endParaRPr lang="en-US"/>
           </a:p>
@@ -4894,7 +4894,7 @@
             <a:fld id="{1D8BD707-D9CF-40AE-B4C6-C98DA3205C09}" type="datetimeFigureOut">
               <a:rPr lang="en-US" smtClean="0"/>
               <a:pPr/>
-              <a:t>1/20/2017</a:t>
+              <a:t>1/26/2017</a:t>
             </a:fld>
             <a:endParaRPr lang="en-US"/>
           </a:p>
@@ -8278,7 +8278,7 @@
           <a:graphicData uri="http://schemas.openxmlformats.org/presentationml/2006/ole">
             <mc:AlternateContent xmlns:mc="http://schemas.openxmlformats.org/markup-compatibility/2006">
               <mc:Choice xmlns:v="urn:schemas-microsoft-com:vml" Requires="v">
-                <p:oleObj spid="_x0000_s108569" name="Equation" r:id="rId4" imgW="1257120" imgH="330120" progId="Equation.3">
+                <p:oleObj spid="_x0000_s108573" name="Equation" r:id="rId4" imgW="1257120" imgH="330120" progId="Equation.3">
                   <p:embed/>
                 </p:oleObj>
               </mc:Choice>
@@ -8619,7 +8619,7 @@
           <p:nvPr/>
         </p:nvPicPr>
         <p:blipFill>
-          <a:blip r:embed="rId3"/>
+          <a:blip r:embed="rId4"/>
           <a:stretch>
             <a:fillRect/>
           </a:stretch>
@@ -8700,7 +8700,7 @@
           <p:nvPr/>
         </p:nvPicPr>
         <p:blipFill>
-          <a:blip r:embed="rId4" cstate="print"/>
+          <a:blip r:embed="rId5" cstate="print"/>
           <a:srcRect/>
           <a:stretch>
             <a:fillRect/>
@@ -8723,6 +8723,179 @@
           </a:ln>
         </p:spPr>
       </p:pic>
+      <p:sp>
+        <p:nvSpPr>
+          <p:cNvPr id="7" name="Rectangle 6"/>
+          <p:cNvSpPr/>
+          <p:nvPr/>
+        </p:nvSpPr>
+        <p:spPr>
+          <a:xfrm>
+            <a:off x="4267200" y="990600"/>
+            <a:ext cx="4211153" cy="1200329"/>
+          </a:xfrm>
+          <a:prstGeom prst="rect">
+            <a:avLst/>
+          </a:prstGeom>
+        </p:spPr>
+        <p:txBody>
+          <a:bodyPr wrap="none">
+            <a:spAutoFit/>
+          </a:bodyPr>
+          <a:lstStyle/>
+          <a:p>
+            <a:endParaRPr lang="en-US" dirty="0"/>
+          </a:p>
+          <a:p>
+            <a:r>
+              <a:rPr lang="en-US" dirty="0"/>
+              <a:t>	 p(∏ | </a:t>
+            </a:r>
+            <a:r>
+              <a:rPr lang="en-US" dirty="0" err="1"/>
+              <a:t>Y</a:t>
+            </a:r>
+            <a:r>
+              <a:rPr lang="en-US" baseline="-25000" dirty="0" err="1"/>
+              <a:t>new</a:t>
+            </a:r>
+            <a:r>
+              <a:rPr lang="en-US" dirty="0"/>
+              <a:t> ) = p(∏) * p(</a:t>
+            </a:r>
+            <a:r>
+              <a:rPr lang="en-US" dirty="0" err="1"/>
+              <a:t>Y</a:t>
+            </a:r>
+            <a:r>
+              <a:rPr lang="en-US" baseline="-25000" dirty="0" err="1"/>
+              <a:t>new</a:t>
+            </a:r>
+            <a:r>
+              <a:rPr lang="en-US" dirty="0"/>
+              <a:t> | ∏ )</a:t>
+            </a:r>
+          </a:p>
+          <a:p>
+            <a:r>
+              <a:rPr lang="en-US" dirty="0"/>
+              <a:t>	</a:t>
+            </a:r>
+          </a:p>
+          <a:p>
+            <a:r>
+              <a:rPr lang="en-US" dirty="0"/>
+              <a:t>	</a:t>
+            </a:r>
+          </a:p>
+        </p:txBody>
+      </p:sp>
+      <p:cxnSp>
+        <p:nvCxnSpPr>
+          <p:cNvPr id="8" name="Straight Connector 7"/>
+          <p:cNvCxnSpPr/>
+          <p:nvPr/>
+        </p:nvCxnSpPr>
+        <p:spPr>
+          <a:xfrm>
+            <a:off x="6629400" y="1733729"/>
+            <a:ext cx="1905000" cy="0"/>
+          </a:xfrm>
+          <a:prstGeom prst="line">
+            <a:avLst/>
+          </a:prstGeom>
+        </p:spPr>
+        <p:style>
+          <a:lnRef idx="1">
+            <a:schemeClr val="accent1"/>
+          </a:lnRef>
+          <a:fillRef idx="0">
+            <a:schemeClr val="accent1"/>
+          </a:fillRef>
+          <a:effectRef idx="0">
+            <a:schemeClr val="accent1"/>
+          </a:effectRef>
+          <a:fontRef idx="minor">
+            <a:schemeClr val="tx1"/>
+          </a:fontRef>
+        </p:style>
+      </p:cxnSp>
+      <p:graphicFrame>
+        <p:nvGraphicFramePr>
+          <p:cNvPr id="9" name="Object 2"/>
+          <p:cNvGraphicFramePr>
+            <a:graphicFrameLocks noChangeAspect="1"/>
+          </p:cNvGraphicFramePr>
+          <p:nvPr>
+            <p:extLst>
+              <p:ext uri="{D42A27DB-BD31-4B8C-83A1-F6EECF244321}">
+                <p14:modId xmlns:p14="http://schemas.microsoft.com/office/powerpoint/2010/main" val="1823902029"/>
+              </p:ext>
+            </p:extLst>
+          </p:nvPr>
+        </p:nvGraphicFramePr>
+        <p:xfrm>
+          <a:off x="6553200" y="1809929"/>
+          <a:ext cx="1743075" cy="457200"/>
+        </p:xfrm>
+        <a:graphic>
+          <a:graphicData uri="http://schemas.openxmlformats.org/presentationml/2006/ole">
+            <mc:AlternateContent xmlns:mc="http://schemas.openxmlformats.org/markup-compatibility/2006">
+              <mc:Choice xmlns:v="urn:schemas-microsoft-com:vml" Requires="v">
+                <p:oleObj spid="_x0000_s109571" name="Equation" r:id="rId6" imgW="1257120" imgH="330120" progId="Equation.3">
+                  <p:embed/>
+                </p:oleObj>
+              </mc:Choice>
+              <mc:Fallback>
+                <p:oleObj name="Equation" r:id="rId6" imgW="1257120" imgH="330120" progId="Equation.3">
+                  <p:embed/>
+                  <p:pic>
+                    <p:nvPicPr>
+                      <p:cNvPr id="7" name="Object 2"/>
+                      <p:cNvPicPr>
+                        <a:picLocks noChangeAspect="1" noChangeArrowheads="1"/>
+                      </p:cNvPicPr>
+                      <p:nvPr/>
+                    </p:nvPicPr>
+                    <p:blipFill>
+                      <a:blip r:embed="rId7">
+                        <a:extLst>
+                          <a:ext uri="{28A0092B-C50C-407E-A947-70E740481C1C}">
+                            <a14:useLocalDpi xmlns:a14="http://schemas.microsoft.com/office/drawing/2010/main" val="0"/>
+                          </a:ext>
+                        </a:extLst>
+                      </a:blip>
+                      <a:srcRect/>
+                      <a:stretch>
+                        <a:fillRect/>
+                      </a:stretch>
+                    </p:blipFill>
+                    <p:spPr bwMode="auto">
+                      <a:xfrm>
+                        <a:off x="6553200" y="1809929"/>
+                        <a:ext cx="1743075" cy="457200"/>
+                      </a:xfrm>
+                      <a:prstGeom prst="rect">
+                        <a:avLst/>
+                      </a:prstGeom>
+                      <a:noFill/>
+                      <a:extLst>
+                        <a:ext uri="{909E8E84-426E-40DD-AFC4-6F175D3DCCD1}">
+                          <a14:hiddenFill xmlns:a14="http://schemas.microsoft.com/office/drawing/2010/main">
+                            <a:solidFill>
+                              <a:srgbClr val="FFFFFF"/>
+                            </a:solidFill>
+                          </a14:hiddenFill>
+                        </a:ext>
+                      </a:extLst>
+                    </p:spPr>
+                  </p:pic>
+                </p:oleObj>
+              </mc:Fallback>
+            </mc:AlternateContent>
+          </a:graphicData>
+        </a:graphic>
+      </p:graphicFrame>
     </p:spTree>
   </p:cSld>
   <p:clrMapOvr>
@@ -9946,18 +10119,14 @@
           <a:lstStyle/>
           <a:p>
             <a:r>
-              <a:rPr lang="en-US" dirty="0" err="1"/>
-              <a:t>Frequentist</a:t>
-            </a:r>
-            <a:r>
-              <a:rPr lang="en-US" dirty="0"/>
-              <a:t>:  Out of all the possible experiments you could have done, how</a:t>
-            </a:r>
-          </a:p>
-          <a:p>
-            <a:r>
-              <a:rPr lang="en-US" dirty="0"/>
-              <a:t>many had at least 34 heads?   Around 0.007</a:t>
+              <a:rPr lang="en-US" dirty="0"/>
+              <a:t>Frequentist:  Out of all the possible experiments you could have done, what fraction</a:t>
+            </a:r>
+          </a:p>
+          <a:p>
+            <a:r>
+              <a:rPr lang="en-US" dirty="0"/>
+              <a:t>had at least 34 heads?   Around 0.007</a:t>
             </a:r>
           </a:p>
           <a:p>
@@ -9996,7 +10165,7 @@
           <a:p>
             <a:r>
               <a:rPr lang="en-US" dirty="0"/>
-              <a:t>Conceptually:  It is a vicious argument in the literature.</a:t>
+              <a:t>Conceptually:  It is a long argument in the literature.</a:t>
             </a:r>
           </a:p>
           <a:p>
@@ -10349,7 +10518,7 @@
           <a:graphicData uri="http://schemas.openxmlformats.org/presentationml/2006/ole">
             <mc:AlternateContent xmlns:mc="http://schemas.openxmlformats.org/markup-compatibility/2006">
               <mc:Choice xmlns:v="urn:schemas-microsoft-com:vml" Requires="v">
-                <p:oleObj spid="_x0000_s54298" name="Equation" r:id="rId4" imgW="1257120" imgH="330120" progId="Equation.3">
+                <p:oleObj spid="_x0000_s54302" name="Equation" r:id="rId4" imgW="1257120" imgH="330120" progId="Equation.3">
                   <p:embed/>
                 </p:oleObj>
               </mc:Choice>

</xml_diff>